<commit_message>
Update unit testing slides
</commit_message>
<xml_diff>
--- a/unit_tests/kennissessie_unit_testing.pptx
+++ b/unit_tests/kennissessie_unit_testing.pptx
@@ -3505,7 +3505,7 @@
         </p:spPr>
         <p:txBody>
           <a:bodyPr>
-            <a:normAutofit/>
+            <a:normAutofit lnSpcReduction="10000"/>
           </a:bodyPr>
           <a:lstStyle/>
           <a:p>
@@ -3565,6 +3565,12 @@
             <a:pPr marL="0" indent="0">
               <a:buNone/>
             </a:pPr>
+            <a:endParaRPr lang="nl-NL" sz="2000" dirty="0"/>
+          </a:p>
+          <a:p>
+            <a:pPr marL="0" indent="0">
+              <a:buNone/>
+            </a:pPr>
             <a:r>
               <a:rPr lang="nl-NL" sz="2000" b="1" dirty="0" err="1"/>
               <a:t>Fixtures</a:t>
@@ -3591,7 +3597,26 @@
             </a:pPr>
             <a:r>
               <a:rPr lang="nl-NL" sz="2000" dirty="0"/>
-              <a:t>Meegegeven aan een test als argument.</a:t>
+              <a:t>Aangemaakt met </a:t>
+            </a:r>
+            <a:r>
+              <a:rPr lang="nl-NL" sz="2000" dirty="0">
+                <a:latin typeface="Courier New" panose="02070309020205020404" pitchFamily="49" charset="0"/>
+                <a:cs typeface="Courier New" panose="02070309020205020404" pitchFamily="49" charset="0"/>
+              </a:rPr>
+              <a:t>@pytest.fixture</a:t>
+            </a:r>
+            <a:r>
+              <a:rPr lang="nl-NL" sz="2000" dirty="0"/>
+              <a:t> </a:t>
+            </a:r>
+            <a:r>
+              <a:rPr lang="nl-NL" sz="2000" dirty="0" err="1"/>
+              <a:t>decorator</a:t>
+            </a:r>
+            <a:r>
+              <a:rPr lang="nl-NL" sz="2000" dirty="0"/>
+              <a:t>.</a:t>
             </a:r>
           </a:p>
           <a:p>
@@ -3601,6 +3626,16 @@
             </a:pPr>
             <a:r>
               <a:rPr lang="nl-NL" sz="2000" dirty="0"/>
+              <a:t>Meegegeven aan een test als argument.</a:t>
+            </a:r>
+          </a:p>
+          <a:p>
+            <a:pPr>
+              <a:buFontTx/>
+              <a:buChar char="-"/>
+            </a:pPr>
+            <a:r>
+              <a:rPr lang="nl-NL" sz="2000" dirty="0"/>
               <a:t>Wordt voor elke test opnieuw aangemaakt!</a:t>
             </a:r>
           </a:p>
@@ -3638,8 +3673,8 @@
         </p:nvSpPr>
         <p:spPr>
           <a:xfrm>
-            <a:off x="7924800" y="1690688"/>
-            <a:ext cx="3962400" cy="4486275"/>
+            <a:off x="7924800" y="1690689"/>
+            <a:ext cx="3962400" cy="1933044"/>
           </a:xfrm>
           <a:prstGeom prst="rect">
             <a:avLst/>
@@ -3660,29 +3695,8 @@
           </a:fontRef>
         </p:style>
         <p:txBody>
-          <a:bodyPr rtlCol="0" anchor="t"/>
-          <a:lstStyle/>
-          <a:p>
-            <a:r>
-              <a:rPr lang="en-US" sz="1200" dirty="0">
-                <a:latin typeface="Courier New" panose="02070309020205020404" pitchFamily="49" charset="0"/>
-                <a:cs typeface="Courier New" panose="02070309020205020404" pitchFamily="49" charset="0"/>
-              </a:rPr>
-              <a:t>"""Module with unit tests for helpers."""</a:t>
-            </a:r>
-          </a:p>
-          <a:p>
-            <a:endParaRPr lang="en-US" sz="1200" dirty="0">
-              <a:latin typeface="Courier New" panose="02070309020205020404" pitchFamily="49" charset="0"/>
-              <a:cs typeface="Courier New" panose="02070309020205020404" pitchFamily="49" charset="0"/>
-            </a:endParaRPr>
-          </a:p>
-          <a:p>
-            <a:endParaRPr lang="en-US" sz="1200" dirty="0">
-              <a:latin typeface="Courier New" panose="02070309020205020404" pitchFamily="49" charset="0"/>
-              <a:cs typeface="Courier New" panose="02070309020205020404" pitchFamily="49" charset="0"/>
-            </a:endParaRPr>
-          </a:p>
+          <a:bodyPr rtlCol="0" anchor="ctr"/>
+          <a:lstStyle/>
           <a:p>
             <a:r>
               <a:rPr lang="en-US" sz="1200" b="1" dirty="0">
@@ -3803,12 +3817,46 @@
               <a:cs typeface="Courier New" panose="02070309020205020404" pitchFamily="49" charset="0"/>
             </a:endParaRPr>
           </a:p>
-          <a:p>
-            <a:endParaRPr lang="en-US" sz="1200" dirty="0">
-              <a:latin typeface="Courier New" panose="02070309020205020404" pitchFamily="49" charset="0"/>
-              <a:cs typeface="Courier New" panose="02070309020205020404" pitchFamily="49" charset="0"/>
-            </a:endParaRPr>
-          </a:p>
+        </p:txBody>
+      </p:sp>
+      <p:sp>
+        <p:nvSpPr>
+          <p:cNvPr id="6" name="Rectangle 5">
+            <a:extLst>
+              <a:ext uri="{FF2B5EF4-FFF2-40B4-BE49-F238E27FC236}">
+                <a16:creationId xmlns:a16="http://schemas.microsoft.com/office/drawing/2014/main" id="{21728304-D7D4-9B8D-CDDD-474B3FE731E8}"/>
+              </a:ext>
+            </a:extLst>
+          </p:cNvPr>
+          <p:cNvSpPr/>
+          <p:nvPr/>
+        </p:nvSpPr>
+        <p:spPr>
+          <a:xfrm>
+            <a:off x="7924800" y="4224866"/>
+            <a:ext cx="3962400" cy="1933044"/>
+          </a:xfrm>
+          <a:prstGeom prst="rect">
+            <a:avLst/>
+          </a:prstGeom>
+        </p:spPr>
+        <p:style>
+          <a:lnRef idx="1">
+            <a:schemeClr val="accent4"/>
+          </a:lnRef>
+          <a:fillRef idx="2">
+            <a:schemeClr val="accent4"/>
+          </a:fillRef>
+          <a:effectRef idx="1">
+            <a:schemeClr val="accent4"/>
+          </a:effectRef>
+          <a:fontRef idx="minor">
+            <a:schemeClr val="dk1"/>
+          </a:fontRef>
+        </p:style>
+        <p:txBody>
+          <a:bodyPr rtlCol="0" anchor="ctr"/>
+          <a:lstStyle/>
           <a:p>
             <a:r>
               <a:rPr lang="en-US" sz="1200" b="1" dirty="0">
@@ -3856,16 +3904,7 @@
                 <a:latin typeface="Courier New" panose="02070309020205020404" pitchFamily="49" charset="0"/>
                 <a:cs typeface="Courier New" panose="02070309020205020404" pitchFamily="49" charset="0"/>
               </a:rPr>
-              <a:t>    return {</a:t>
-            </a:r>
-          </a:p>
-          <a:p>
-            <a:r>
-              <a:rPr lang="en-US" sz="1200" dirty="0">
-                <a:latin typeface="Courier New" panose="02070309020205020404" pitchFamily="49" charset="0"/>
-                <a:cs typeface="Courier New" panose="02070309020205020404" pitchFamily="49" charset="0"/>
-              </a:rPr>
-              <a:t>        "</a:t>
+              <a:t>    return {"</a:t>
             </a:r>
             <a:r>
               <a:rPr lang="en-US" sz="1200" dirty="0" err="1">
@@ -3879,7 +3918,56 @@
                 <a:latin typeface="Courier New" panose="02070309020205020404" pitchFamily="49" charset="0"/>
                 <a:cs typeface="Courier New" panose="02070309020205020404" pitchFamily="49" charset="0"/>
               </a:rPr>
-              <a:t>": 0,</a:t>
+              <a:t>": 0}</a:t>
+            </a:r>
+          </a:p>
+          <a:p>
+            <a:endParaRPr lang="en-US" sz="1200" dirty="0">
+              <a:latin typeface="Courier New" panose="02070309020205020404" pitchFamily="49" charset="0"/>
+              <a:cs typeface="Courier New" panose="02070309020205020404" pitchFamily="49" charset="0"/>
+            </a:endParaRPr>
+          </a:p>
+          <a:p>
+            <a:endParaRPr lang="en-US" sz="1200" dirty="0">
+              <a:latin typeface="Courier New" panose="02070309020205020404" pitchFamily="49" charset="0"/>
+              <a:cs typeface="Courier New" panose="02070309020205020404" pitchFamily="49" charset="0"/>
+            </a:endParaRPr>
+          </a:p>
+          <a:p>
+            <a:r>
+              <a:rPr lang="en-US" sz="1200" b="1" dirty="0">
+                <a:latin typeface="Courier New" panose="02070309020205020404" pitchFamily="49" charset="0"/>
+                <a:cs typeface="Courier New" panose="02070309020205020404" pitchFamily="49" charset="0"/>
+              </a:rPr>
+              <a:t>def </a:t>
+            </a:r>
+            <a:r>
+              <a:rPr lang="en-US" sz="1200" b="1" dirty="0" err="1">
+                <a:latin typeface="Courier New" panose="02070309020205020404" pitchFamily="49" charset="0"/>
+                <a:cs typeface="Courier New" panose="02070309020205020404" pitchFamily="49" charset="0"/>
+              </a:rPr>
+              <a:t>test_update_config</a:t>
+            </a:r>
+            <a:r>
+              <a:rPr lang="en-US" sz="1200" b="1" dirty="0">
+                <a:latin typeface="Courier New" panose="02070309020205020404" pitchFamily="49" charset="0"/>
+                <a:cs typeface="Courier New" panose="02070309020205020404" pitchFamily="49" charset="0"/>
+              </a:rPr>
+              <a:t>(</a:t>
+            </a:r>
+            <a:r>
+              <a:rPr lang="en-US" sz="1200" b="1" dirty="0" err="1">
+                <a:latin typeface="Courier New" panose="02070309020205020404" pitchFamily="49" charset="0"/>
+                <a:cs typeface="Courier New" panose="02070309020205020404" pitchFamily="49" charset="0"/>
+              </a:rPr>
+              <a:t>default_config</a:t>
+            </a:r>
+            <a:r>
+              <a:rPr lang="en-US" sz="1200" b="1" dirty="0">
+                <a:latin typeface="Courier New" panose="02070309020205020404" pitchFamily="49" charset="0"/>
+                <a:cs typeface="Courier New" panose="02070309020205020404" pitchFamily="49" charset="0"/>
+              </a:rPr>
+              <a:t>):</a:t>
             </a:r>
           </a:p>
           <a:p>
@@ -3888,7 +3976,7 @@
                 <a:latin typeface="Courier New" panose="02070309020205020404" pitchFamily="49" charset="0"/>
                 <a:cs typeface="Courier New" panose="02070309020205020404" pitchFamily="49" charset="0"/>
               </a:rPr>
-              <a:t>    }</a:t>
+              <a:t>    """Test updating configuration."""</a:t>
             </a:r>
           </a:p>
           <a:p>
@@ -3896,21 +3984,6 @@
               <a:latin typeface="Courier New" panose="02070309020205020404" pitchFamily="49" charset="0"/>
               <a:cs typeface="Courier New" panose="02070309020205020404" pitchFamily="49" charset="0"/>
             </a:endParaRPr>
-          </a:p>
-          <a:p>
-            <a:endParaRPr lang="en-US" sz="1200" dirty="0">
-              <a:latin typeface="Courier New" panose="02070309020205020404" pitchFamily="49" charset="0"/>
-              <a:cs typeface="Courier New" panose="02070309020205020404" pitchFamily="49" charset="0"/>
-            </a:endParaRPr>
-          </a:p>
-          <a:p>
-            <a:r>
-              <a:rPr lang="en-US" sz="1200" dirty="0">
-                <a:latin typeface="Courier New" panose="02070309020205020404" pitchFamily="49" charset="0"/>
-                <a:cs typeface="Courier New" panose="02070309020205020404" pitchFamily="49" charset="0"/>
-              </a:rPr>
-              <a:t>...</a:t>
-            </a:r>
           </a:p>
         </p:txBody>
       </p:sp>
@@ -4570,11 +4643,11 @@
             <a:lstStyle/>
             <a:p>
               <a:r>
-                <a:rPr lang="en-US" dirty="0">
+                <a:rPr lang="en-US" b="1" dirty="0">
                   <a:latin typeface="Courier New" panose="02070309020205020404" pitchFamily="49" charset="0"/>
                   <a:cs typeface="Courier New" panose="02070309020205020404" pitchFamily="49" charset="0"/>
                 </a:rPr>
-                <a:t>def sum(numbers):</a:t>
+                <a:t>def total(numbers):</a:t>
               </a:r>
             </a:p>
             <a:p>
@@ -4592,7 +4665,7 @@
                   <a:latin typeface="Courier New" panose="02070309020205020404" pitchFamily="49" charset="0"/>
                   <a:cs typeface="Courier New" panose="02070309020205020404" pitchFamily="49" charset="0"/>
                 </a:rPr>
-                <a:t>  for number in numbers</a:t>
+                <a:t>  for number in numbers:</a:t>
               </a:r>
             </a:p>
             <a:p>
@@ -4718,7 +4791,7 @@
             <a:p>
               <a:r>
                 <a:rPr lang="en-US" dirty="0"/>
-                <a:t>sum([1, 2, 3]) =&gt; 6</a:t>
+                <a:t>total([1, 2, 3]) =&gt; 6</a:t>
               </a:r>
             </a:p>
           </p:txBody>
@@ -4822,11 +4895,11 @@
             <a:lstStyle/>
             <a:p>
               <a:r>
-                <a:rPr lang="en-US" dirty="0">
+                <a:rPr lang="en-US" b="1" dirty="0">
                   <a:latin typeface="Courier New" panose="02070309020205020404" pitchFamily="49" charset="0"/>
                   <a:cs typeface="Courier New" panose="02070309020205020404" pitchFamily="49" charset="0"/>
                 </a:rPr>
-                <a:t>def sum(numbers):</a:t>
+                <a:t>def total(numbers):</a:t>
               </a:r>
             </a:p>
             <a:p>
@@ -4943,7 +5016,7 @@
             <a:p>
               <a:r>
                 <a:rPr lang="en-US" dirty="0"/>
-                <a:t>sum([1, 2, 3]) =&gt; 6</a:t>
+                <a:t>total([1, 2, 3]) =&gt; 6</a:t>
               </a:r>
             </a:p>
           </p:txBody>
@@ -5169,7 +5242,14 @@
             </a:pPr>
             <a:r>
               <a:rPr lang="nl-NL" sz="2000" dirty="0"/>
-              <a:t>Correct of incorrect is niet het doel.</a:t>
+              <a:t>Consistente functionaliteit is het doel.</a:t>
+            </a:r>
+          </a:p>
+          <a:p>
+            <a:pPr lvl="1"/>
+            <a:r>
+              <a:rPr lang="nl-NL" sz="1600" dirty="0"/>
+              <a:t>Referentie is hoe de code aanvankelijk werkte.</a:t>
             </a:r>
           </a:p>
           <a:p>
@@ -5177,13 +5257,6 @@
             <a:r>
               <a:rPr lang="nl-NL" sz="1600" dirty="0"/>
               <a:t>Wat correct of incorrect is, is vaak subjectief.</a:t>
-            </a:r>
-          </a:p>
-          <a:p>
-            <a:pPr lvl="1"/>
-            <a:r>
-              <a:rPr lang="nl-NL" sz="1600" dirty="0"/>
-              <a:t>Referentie is hoe de code aanvankelijk werkte.</a:t>
             </a:r>
           </a:p>
           <a:p>
@@ -5198,7 +5271,7 @@
             </a:pPr>
             <a:r>
               <a:rPr lang="nl-NL" sz="2000" dirty="0"/>
-              <a:t>Belangrijk tijdens ontwikkelen van je code.</a:t>
+              <a:t>Belangrijk tijdens ontwikkeling van je code.</a:t>
             </a:r>
           </a:p>
           <a:p>
@@ -5241,40 +5314,22 @@
             <a:pPr lvl="1"/>
             <a:r>
               <a:rPr lang="nl-NL" sz="1600" dirty="0"/>
-              <a:t>Tests maken de gevolgen van een code wijziging inzichtelijk.</a:t>
+              <a:t>Tests maken gevolgen van wijzigingen inzichtelijk.</a:t>
             </a:r>
           </a:p>
           <a:p>
             <a:pPr lvl="1"/>
             <a:r>
               <a:rPr lang="nl-NL" sz="1600" dirty="0"/>
-              <a:t>Tests geven concrete voorbeelden wat de “bedoeling” van een functie is.</a:t>
+              <a:t>Tests geven concrete voorbeelden van de “bedoeling” van code.</a:t>
             </a:r>
           </a:p>
           <a:p>
             <a:pPr lvl="1"/>
             <a:r>
               <a:rPr lang="nl-NL" sz="1600" dirty="0"/>
-              <a:t>Tests sporen aan na te denken over functionaliteit; wat is nodig, wat niet?</a:t>
-            </a:r>
-          </a:p>
-          <a:p>
-            <a:pPr marL="0" indent="0">
-              <a:buNone/>
-            </a:pPr>
-            <a:endParaRPr lang="nl-NL" sz="2000" dirty="0"/>
-          </a:p>
-          <a:p>
-            <a:pPr marL="457200" indent="-457200">
-              <a:buAutoNum type="arabicPeriod"/>
-            </a:pPr>
-            <a:endParaRPr lang="nl-NL" sz="2000" dirty="0"/>
-          </a:p>
-          <a:p>
-            <a:pPr marL="0" indent="0">
-              <a:buNone/>
-            </a:pPr>
-            <a:endParaRPr lang="nl-NL" sz="2000" dirty="0"/>
+              <a:t>Tests moedigen grondige inspectie code aan; wat is nodig, wat niet?</a:t>
+            </a:r>
           </a:p>
         </p:txBody>
       </p:sp>
@@ -5419,7 +5474,7 @@
         </p:spPr>
         <p:txBody>
           <a:bodyPr>
-            <a:normAutofit fontScale="92500" lnSpcReduction="10000"/>
+            <a:normAutofit/>
           </a:bodyPr>
           <a:lstStyle/>
           <a:p>
@@ -5520,7 +5575,7 @@
             </a:pPr>
             <a:r>
               <a:rPr lang="nl-NL" sz="2000" dirty="0"/>
-              <a:t>De functie naam en </a:t>
+              <a:t>Naam en </a:t>
             </a:r>
             <a:r>
               <a:rPr lang="nl-NL" sz="2000" dirty="0" err="1"/>
@@ -5528,7 +5583,7 @@
             </a:r>
             <a:r>
               <a:rPr lang="nl-NL" sz="2000" dirty="0"/>
-              <a:t> moeten het doel van de test glashelder maken.</a:t>
+              <a:t> maken het doel van de test glashelder.</a:t>
             </a:r>
           </a:p>
           <a:p>
@@ -5542,8 +5597,12 @@
               <a:buNone/>
             </a:pPr>
             <a:r>
+              <a:rPr lang="nl-NL" sz="2000" dirty="0" err="1"/>
+              <a:t>Één</a:t>
+            </a:r>
+            <a:r>
               <a:rPr lang="nl-NL" sz="2000" dirty="0"/>
-              <a:t>Een test moet één functionaliteit testen; oftewel 1 </a:t>
+              <a:t> functionaliteit per test; oftewel 1 </a:t>
             </a:r>
             <a:r>
               <a:rPr lang="nl-NL" sz="2000" dirty="0" err="1">
@@ -5554,7 +5613,7 @@
             </a:r>
             <a:r>
               <a:rPr lang="nl-NL" sz="2000" dirty="0"/>
-              <a:t> statement per test.</a:t>
+              <a:t> statement.</a:t>
             </a:r>
           </a:p>
           <a:p>

</xml_diff>

<commit_message>
Add latest PowerPoint slides
</commit_message>
<xml_diff>
--- a/unit_tests/kennissessie_unit_testing.pptx
+++ b/unit_tests/kennissessie_unit_testing.pptx
@@ -272,7 +272,7 @@
           <a:p>
             <a:fld id="{3A72EAAC-A5DF-46E2-8BCD-752A9EF6F604}" type="datetimeFigureOut">
               <a:rPr lang="en-NL" smtClean="0"/>
-              <a:t>23/05/2022</a:t>
+              <a:t>24/05/2022</a:t>
             </a:fld>
             <a:endParaRPr lang="en-NL"/>
           </a:p>
@@ -472,7 +472,7 @@
           <a:p>
             <a:fld id="{3A72EAAC-A5DF-46E2-8BCD-752A9EF6F604}" type="datetimeFigureOut">
               <a:rPr lang="en-NL" smtClean="0"/>
-              <a:t>23/05/2022</a:t>
+              <a:t>24/05/2022</a:t>
             </a:fld>
             <a:endParaRPr lang="en-NL"/>
           </a:p>
@@ -682,7 +682,7 @@
           <a:p>
             <a:fld id="{3A72EAAC-A5DF-46E2-8BCD-752A9EF6F604}" type="datetimeFigureOut">
               <a:rPr lang="en-NL" smtClean="0"/>
-              <a:t>23/05/2022</a:t>
+              <a:t>24/05/2022</a:t>
             </a:fld>
             <a:endParaRPr lang="en-NL"/>
           </a:p>
@@ -882,7 +882,7 @@
           <a:p>
             <a:fld id="{3A72EAAC-A5DF-46E2-8BCD-752A9EF6F604}" type="datetimeFigureOut">
               <a:rPr lang="en-NL" smtClean="0"/>
-              <a:t>23/05/2022</a:t>
+              <a:t>24/05/2022</a:t>
             </a:fld>
             <a:endParaRPr lang="en-NL"/>
           </a:p>
@@ -1158,7 +1158,7 @@
           <a:p>
             <a:fld id="{3A72EAAC-A5DF-46E2-8BCD-752A9EF6F604}" type="datetimeFigureOut">
               <a:rPr lang="en-NL" smtClean="0"/>
-              <a:t>23/05/2022</a:t>
+              <a:t>24/05/2022</a:t>
             </a:fld>
             <a:endParaRPr lang="en-NL"/>
           </a:p>
@@ -1426,7 +1426,7 @@
           <a:p>
             <a:fld id="{3A72EAAC-A5DF-46E2-8BCD-752A9EF6F604}" type="datetimeFigureOut">
               <a:rPr lang="en-NL" smtClean="0"/>
-              <a:t>23/05/2022</a:t>
+              <a:t>24/05/2022</a:t>
             </a:fld>
             <a:endParaRPr lang="en-NL"/>
           </a:p>
@@ -1841,7 +1841,7 @@
           <a:p>
             <a:fld id="{3A72EAAC-A5DF-46E2-8BCD-752A9EF6F604}" type="datetimeFigureOut">
               <a:rPr lang="en-NL" smtClean="0"/>
-              <a:t>23/05/2022</a:t>
+              <a:t>24/05/2022</a:t>
             </a:fld>
             <a:endParaRPr lang="en-NL"/>
           </a:p>
@@ -1983,7 +1983,7 @@
           <a:p>
             <a:fld id="{3A72EAAC-A5DF-46E2-8BCD-752A9EF6F604}" type="datetimeFigureOut">
               <a:rPr lang="en-NL" smtClean="0"/>
-              <a:t>23/05/2022</a:t>
+              <a:t>24/05/2022</a:t>
             </a:fld>
             <a:endParaRPr lang="en-NL"/>
           </a:p>
@@ -2096,7 +2096,7 @@
           <a:p>
             <a:fld id="{3A72EAAC-A5DF-46E2-8BCD-752A9EF6F604}" type="datetimeFigureOut">
               <a:rPr lang="en-NL" smtClean="0"/>
-              <a:t>23/05/2022</a:t>
+              <a:t>24/05/2022</a:t>
             </a:fld>
             <a:endParaRPr lang="en-NL"/>
           </a:p>
@@ -2409,7 +2409,7 @@
           <a:p>
             <a:fld id="{3A72EAAC-A5DF-46E2-8BCD-752A9EF6F604}" type="datetimeFigureOut">
               <a:rPr lang="en-NL" smtClean="0"/>
-              <a:t>23/05/2022</a:t>
+              <a:t>24/05/2022</a:t>
             </a:fld>
             <a:endParaRPr lang="en-NL"/>
           </a:p>
@@ -2698,7 +2698,7 @@
           <a:p>
             <a:fld id="{3A72EAAC-A5DF-46E2-8BCD-752A9EF6F604}" type="datetimeFigureOut">
               <a:rPr lang="en-NL" smtClean="0"/>
-              <a:t>23/05/2022</a:t>
+              <a:t>24/05/2022</a:t>
             </a:fld>
             <a:endParaRPr lang="en-NL"/>
           </a:p>
@@ -2941,7 +2941,7 @@
           <a:p>
             <a:fld id="{3A72EAAC-A5DF-46E2-8BCD-752A9EF6F604}" type="datetimeFigureOut">
               <a:rPr lang="en-NL" smtClean="0"/>
-              <a:t>23/05/2022</a:t>
+              <a:t>24/05/2022</a:t>
             </a:fld>
             <a:endParaRPr lang="en-NL"/>
           </a:p>
@@ -4128,7 +4128,7 @@
         <p:spPr/>
         <p:txBody>
           <a:bodyPr>
-            <a:normAutofit/>
+            <a:normAutofit fontScale="92500" lnSpcReduction="20000"/>
           </a:bodyPr>
           <a:lstStyle/>
           <a:p>
@@ -4174,8 +4174,10 @@
             </a:r>
           </a:p>
           <a:p>
-            <a:pPr lvl="1"/>
-            <a:endParaRPr lang="nl-NL" sz="1600" dirty="0"/>
+            <a:pPr marL="0" indent="0">
+              <a:buNone/>
+            </a:pPr>
+            <a:endParaRPr lang="nl-NL" sz="2000" dirty="0"/>
           </a:p>
           <a:p>
             <a:r>
@@ -4214,8 +4216,16 @@
             </a:r>
           </a:p>
           <a:p>
-            <a:pPr lvl="1"/>
-            <a:endParaRPr lang="nl-NL" sz="1600" dirty="0"/>
+            <a:endParaRPr lang="nl-NL" sz="2000" dirty="0"/>
+          </a:p>
+          <a:p>
+            <a:r>
+              <a:rPr lang="nl-NL" sz="2000" dirty="0"/>
+              <a:t>Wacht niet te lang met tests schrijven!</a:t>
+            </a:r>
+          </a:p>
+          <a:p>
+            <a:endParaRPr lang="nl-NL" sz="2000" dirty="0"/>
           </a:p>
           <a:p>
             <a:r>
@@ -4253,7 +4263,7 @@
             <a:pPr lvl="1"/>
             <a:r>
               <a:rPr lang="nl-NL" sz="1600" dirty="0"/>
-              <a:t>Maar dekking zegt weinig; zijn zinvolle scenario’s getest?</a:t>
+              <a:t>Dekking zegt niet alles; zijn (alle) zinvolle scenario’s getest?</a:t>
             </a:r>
           </a:p>
           <a:p>
@@ -5285,7 +5295,7 @@
             <a:pPr lvl="1"/>
             <a:r>
               <a:rPr lang="nl-NL" sz="1600" dirty="0"/>
-              <a:t>Geen effect op gebruikers van je code.</a:t>
+              <a:t>Geen enkel effect op gebruik van je code.</a:t>
             </a:r>
           </a:p>
           <a:p>

</xml_diff>